<commit_message>
Last minute updates to RubyConf 2019
</commit_message>
<xml_diff>
--- a/presentations/rubyconf/2019/containerizing_local_dev.pptx
+++ b/presentations/rubyconf/2019/containerizing_local_dev.pptx
@@ -235,7 +235,7 @@
           <a:p>
             <a:fld id="{A6E1757E-FB89-F849-9617-9D432157BB30}" type="datetimeFigureOut">
               <a:rPr lang="en-US" smtClean="0"/>
-              <a:t>11/15/19</a:t>
+              <a:t>11/20/19</a:t>
             </a:fld>
             <a:endParaRPr lang="en-US"/>
           </a:p>
@@ -2185,7 +2185,7 @@
           <a:p>
             <a:fld id="{A099380F-684D-AB47-8077-7730C31D961C}" type="datetimeFigureOut">
               <a:rPr lang="en-US" smtClean="0"/>
-              <a:t>11/15/19</a:t>
+              <a:t>11/20/19</a:t>
             </a:fld>
             <a:endParaRPr lang="en-US"/>
           </a:p>
@@ -2407,7 +2407,7 @@
           <a:p>
             <a:fld id="{A099380F-684D-AB47-8077-7730C31D961C}" type="datetimeFigureOut">
               <a:rPr lang="en-US" smtClean="0"/>
-              <a:t>11/15/19</a:t>
+              <a:t>11/20/19</a:t>
             </a:fld>
             <a:endParaRPr lang="en-US"/>
           </a:p>
@@ -2639,7 +2639,7 @@
           <a:p>
             <a:fld id="{A099380F-684D-AB47-8077-7730C31D961C}" type="datetimeFigureOut">
               <a:rPr lang="en-US" smtClean="0"/>
-              <a:t>11/15/19</a:t>
+              <a:t>11/20/19</a:t>
             </a:fld>
             <a:endParaRPr lang="en-US"/>
           </a:p>
@@ -2861,7 +2861,7 @@
           <a:p>
             <a:fld id="{A099380F-684D-AB47-8077-7730C31D961C}" type="datetimeFigureOut">
               <a:rPr lang="en-US" smtClean="0"/>
-              <a:t>11/15/19</a:t>
+              <a:t>11/20/19</a:t>
             </a:fld>
             <a:endParaRPr lang="en-US"/>
           </a:p>
@@ -3160,7 +3160,7 @@
           <a:p>
             <a:fld id="{A099380F-684D-AB47-8077-7730C31D961C}" type="datetimeFigureOut">
               <a:rPr lang="en-US" smtClean="0"/>
-              <a:t>11/15/19</a:t>
+              <a:t>11/20/19</a:t>
             </a:fld>
             <a:endParaRPr lang="en-US"/>
           </a:p>
@@ -3449,7 +3449,7 @@
           <a:p>
             <a:fld id="{A099380F-684D-AB47-8077-7730C31D961C}" type="datetimeFigureOut">
               <a:rPr lang="en-US" smtClean="0"/>
-              <a:t>11/15/19</a:t>
+              <a:t>11/20/19</a:t>
             </a:fld>
             <a:endParaRPr lang="en-US"/>
           </a:p>
@@ -3885,7 +3885,7 @@
           <a:p>
             <a:fld id="{A099380F-684D-AB47-8077-7730C31D961C}" type="datetimeFigureOut">
               <a:rPr lang="en-US" smtClean="0"/>
-              <a:t>11/15/19</a:t>
+              <a:t>11/20/19</a:t>
             </a:fld>
             <a:endParaRPr lang="en-US"/>
           </a:p>
@@ -4050,7 +4050,7 @@
           <a:p>
             <a:fld id="{A099380F-684D-AB47-8077-7730C31D961C}" type="datetimeFigureOut">
               <a:rPr lang="en-US" smtClean="0"/>
-              <a:t>11/15/19</a:t>
+              <a:t>11/20/19</a:t>
             </a:fld>
             <a:endParaRPr lang="en-US"/>
           </a:p>
@@ -4187,7 +4187,7 @@
           <a:p>
             <a:fld id="{A099380F-684D-AB47-8077-7730C31D961C}" type="datetimeFigureOut">
               <a:rPr lang="en-US" smtClean="0"/>
-              <a:t>11/15/19</a:t>
+              <a:t>11/20/19</a:t>
             </a:fld>
             <a:endParaRPr lang="en-US"/>
           </a:p>
@@ -4522,7 +4522,7 @@
           <a:p>
             <a:fld id="{A099380F-684D-AB47-8077-7730C31D961C}" type="datetimeFigureOut">
               <a:rPr lang="en-US" smtClean="0"/>
-              <a:t>11/15/19</a:t>
+              <a:t>11/20/19</a:t>
             </a:fld>
             <a:endParaRPr lang="en-US"/>
           </a:p>
@@ -4834,7 +4834,7 @@
           <a:p>
             <a:fld id="{A099380F-684D-AB47-8077-7730C31D961C}" type="datetimeFigureOut">
               <a:rPr lang="en-US" smtClean="0"/>
-              <a:t>11/15/19</a:t>
+              <a:t>11/20/19</a:t>
             </a:fld>
             <a:endParaRPr lang="en-US"/>
           </a:p>
@@ -5091,7 +5091,7 @@
           <a:p>
             <a:fld id="{A099380F-684D-AB47-8077-7730C31D961C}" type="datetimeFigureOut">
               <a:rPr lang="en-US" smtClean="0"/>
-              <a:t>11/15/19</a:t>
+              <a:t>11/20/19</a:t>
             </a:fld>
             <a:endParaRPr lang="en-US"/>
           </a:p>
@@ -10216,7 +10216,7 @@
           <a:p>
             <a:r>
               <a:rPr lang="en-US" sz="2800" dirty="0"/>
-              <a:t>…Could containers be used to better manage this?</a:t>
+              <a:t>…could containers be used to better manage this?</a:t>
             </a:r>
           </a:p>
         </p:txBody>
@@ -12214,7 +12214,7 @@
             <a:pPr algn="ctr"/>
             <a:r>
               <a:rPr lang="en-US" sz="2400" dirty="0"/>
-              <a:t>All of my side projects</a:t>
+              <a:t>All my side projects</a:t>
             </a:r>
           </a:p>
         </p:txBody>

</xml_diff>